<commit_message>
Concurrency example in EF Core added
</commit_message>
<xml_diff>
--- a/Slides/Lecture11 - CSharp Redux.pptx
+++ b/Slides/Lecture11 - CSharp Redux.pptx
@@ -5,14 +5,23 @@
     <p:sldMasterId id="2147484082" r:id="rId4"/>
   </p:sldMasterIdLst>
   <p:notesMasterIdLst>
-    <p:notesMasterId r:id="rId7"/>
+    <p:notesMasterId r:id="rId16"/>
   </p:notesMasterIdLst>
   <p:handoutMasterIdLst>
-    <p:handoutMasterId r:id="rId8"/>
+    <p:handoutMasterId r:id="rId17"/>
   </p:handoutMasterIdLst>
   <p:sldIdLst>
     <p:sldId id="897" r:id="rId5"/>
     <p:sldId id="927" r:id="rId6"/>
+    <p:sldId id="933" r:id="rId7"/>
+    <p:sldId id="932" r:id="rId8"/>
+    <p:sldId id="934" r:id="rId9"/>
+    <p:sldId id="930" r:id="rId10"/>
+    <p:sldId id="931" r:id="rId11"/>
+    <p:sldId id="935" r:id="rId12"/>
+    <p:sldId id="936" r:id="rId13"/>
+    <p:sldId id="937" r:id="rId14"/>
+    <p:sldId id="938" r:id="rId15"/>
   </p:sldIdLst>
   <p:sldSz cx="9326563" cy="6994525"/>
   <p:notesSz cx="6858000" cy="9144000"/>
@@ -118,6 +127,15 @@
           <p14:sldIdLst>
             <p14:sldId id="897"/>
             <p14:sldId id="927"/>
+            <p14:sldId id="933"/>
+            <p14:sldId id="932"/>
+            <p14:sldId id="934"/>
+            <p14:sldId id="930"/>
+            <p14:sldId id="931"/>
+            <p14:sldId id="935"/>
+            <p14:sldId id="936"/>
+            <p14:sldId id="937"/>
+            <p14:sldId id="938"/>
           </p14:sldIdLst>
         </p14:section>
       </p14:sectionLst>
@@ -332,7 +350,7 @@
               <a:rPr lang="en-US" smtClean="0">
                 <a:latin typeface="Segoe UI" pitchFamily="34" charset="0"/>
               </a:rPr>
-              <a:t>11/14/2018</a:t>
+              <a:t>11/16/2018</a:t>
             </a:fld>
             <a:endParaRPr lang="en-US" dirty="0">
               <a:latin typeface="Segoe UI" pitchFamily="34" charset="0"/>
@@ -655,7 +673,7 @@
             <a:fld id="{D51B1278-D92B-4AF3-A9C1-71DD298190CE}" type="datetimeFigureOut">
               <a:rPr lang="en-US" smtClean="0"/>
               <a:pPr/>
-              <a:t>11/14/2018</a:t>
+              <a:t>11/16/2018</a:t>
             </a:fld>
             <a:endParaRPr lang="en-US" dirty="0"/>
           </a:p>
@@ -1060,7 +1078,7 @@
           <a:p>
             <a:fld id="{23C664AC-E9A8-46F0-BB26-995D9E922CBA}" type="datetime1">
               <a:rPr lang="en-US" smtClean="0"/>
-              <a:t>11/14/2018</a:t>
+              <a:t>11/16/2018</a:t>
             </a:fld>
             <a:endParaRPr lang="en-US" dirty="0"/>
           </a:p>
@@ -1263,7 +1281,7 @@
           <a:p>
             <a:fld id="{C4F94B10-4342-40FC-AEC6-5C03AF201BA2}" type="datetime1">
               <a:rPr lang="en-US" smtClean="0"/>
-              <a:t>11/14/2018</a:t>
+              <a:t>11/16/2018</a:t>
             </a:fld>
             <a:endParaRPr lang="en-US" dirty="0"/>
           </a:p>
@@ -5023,6 +5041,219 @@
 </p:sld>
 </file>
 
+<file path=ppt/slides/slide10.xml><?xml version="1.0" encoding="utf-8"?>
+<p:sld xmlns:a="http://schemas.openxmlformats.org/drawingml/2006/main" xmlns:r="http://schemas.openxmlformats.org/officeDocument/2006/relationships" xmlns:p="http://schemas.openxmlformats.org/presentationml/2006/main">
+  <p:cSld>
+    <p:bg>
+      <p:bgPr>
+        <a:solidFill>
+          <a:srgbClr val="92D050"/>
+        </a:solidFill>
+        <a:effectLst/>
+      </p:bgPr>
+    </p:bg>
+    <p:spTree>
+      <p:nvGrpSpPr>
+        <p:cNvPr id="1" name=""/>
+        <p:cNvGrpSpPr/>
+        <p:nvPr/>
+      </p:nvGrpSpPr>
+      <p:grpSpPr>
+        <a:xfrm>
+          <a:off x="0" y="0"/>
+          <a:ext cx="0" cy="0"/>
+          <a:chOff x="0" y="0"/>
+          <a:chExt cx="0" cy="0"/>
+        </a:xfrm>
+      </p:grpSpPr>
+      <p:sp>
+        <p:nvSpPr>
+          <p:cNvPr id="2" name="Title 1">
+            <a:extLst>
+              <a:ext uri="{FF2B5EF4-FFF2-40B4-BE49-F238E27FC236}">
+                <a16:creationId xmlns:a16="http://schemas.microsoft.com/office/drawing/2014/main" id="{EC27E017-8119-467D-A4AF-06184FA87B00}"/>
+              </a:ext>
+            </a:extLst>
+          </p:cNvPr>
+          <p:cNvSpPr>
+            <a:spLocks noGrp="1"/>
+          </p:cNvSpPr>
+          <p:nvPr>
+            <p:ph type="title"/>
+          </p:nvPr>
+        </p:nvSpPr>
+        <p:spPr/>
+        <p:txBody>
+          <a:bodyPr/>
+          <a:lstStyle/>
+          <a:p>
+            <a:r>
+              <a:rPr lang="da-DK" dirty="0"/>
+              <a:t>Integration testing</a:t>
+            </a:r>
+            <a:endParaRPr lang="en-DK" dirty="0"/>
+          </a:p>
+        </p:txBody>
+      </p:sp>
+      <p:sp>
+        <p:nvSpPr>
+          <p:cNvPr id="3" name="Text Placeholder 2">
+            <a:extLst>
+              <a:ext uri="{FF2B5EF4-FFF2-40B4-BE49-F238E27FC236}">
+                <a16:creationId xmlns:a16="http://schemas.microsoft.com/office/drawing/2014/main" id="{6BF589C4-7979-4FB5-8C9B-9360237244E9}"/>
+              </a:ext>
+            </a:extLst>
+          </p:cNvPr>
+          <p:cNvSpPr>
+            <a:spLocks noGrp="1"/>
+          </p:cNvSpPr>
+          <p:nvPr>
+            <p:ph type="body" sz="quarter" idx="10"/>
+          </p:nvPr>
+        </p:nvSpPr>
+        <p:spPr>
+          <a:xfrm>
+            <a:off x="274209" y="1212850"/>
+            <a:ext cx="8778240" cy="3619452"/>
+          </a:xfrm>
+        </p:spPr>
+        <p:txBody>
+          <a:bodyPr/>
+          <a:lstStyle/>
+          <a:p>
+            <a:r>
+              <a:rPr lang="da-DK" dirty="0">
+                <a:hlinkClick r:id="rId2"/>
+              </a:rPr>
+              <a:t>https://docs.microsoft.com/en-us/aspnet/core/test/integration-tests</a:t>
+            </a:r>
+            <a:endParaRPr lang="da-DK" dirty="0"/>
+          </a:p>
+          <a:p>
+            <a:endParaRPr lang="da-DK" dirty="0"/>
+          </a:p>
+          <a:p>
+            <a:r>
+              <a:rPr lang="da-DK" dirty="0">
+                <a:solidFill>
+                  <a:schemeClr val="tx1"/>
+                </a:solidFill>
+              </a:rPr>
+              <a:t>Limit scope</a:t>
+            </a:r>
+          </a:p>
+          <a:p>
+            <a:r>
+              <a:rPr lang="da-DK" dirty="0">
+                <a:solidFill>
+                  <a:schemeClr val="tx1"/>
+                </a:solidFill>
+              </a:rPr>
+              <a:t>Separate project</a:t>
+            </a:r>
+          </a:p>
+          <a:p>
+            <a:r>
+              <a:rPr lang="da-DK" dirty="0">
+                <a:solidFill>
+                  <a:schemeClr val="tx1"/>
+                </a:solidFill>
+              </a:rPr>
+              <a:t>Run infrequently</a:t>
+            </a:r>
+            <a:endParaRPr lang="en-DK" dirty="0">
+              <a:solidFill>
+                <a:schemeClr val="tx1"/>
+              </a:solidFill>
+            </a:endParaRPr>
+          </a:p>
+        </p:txBody>
+      </p:sp>
+    </p:spTree>
+    <p:extLst>
+      <p:ext uri="{BB962C8B-B14F-4D97-AF65-F5344CB8AC3E}">
+        <p14:creationId xmlns:p14="http://schemas.microsoft.com/office/powerpoint/2010/main" val="647932516"/>
+      </p:ext>
+    </p:extLst>
+  </p:cSld>
+  <p:clrMapOvr>
+    <a:masterClrMapping/>
+  </p:clrMapOvr>
+  <p:transition>
+    <p:fade/>
+  </p:transition>
+</p:sld>
+</file>
+
+<file path=ppt/slides/slide11.xml><?xml version="1.0" encoding="utf-8"?>
+<p:sld xmlns:a="http://schemas.openxmlformats.org/drawingml/2006/main" xmlns:r="http://schemas.openxmlformats.org/officeDocument/2006/relationships" xmlns:p="http://schemas.openxmlformats.org/presentationml/2006/main">
+  <p:cSld>
+    <p:spTree>
+      <p:nvGrpSpPr>
+        <p:cNvPr id="1" name=""/>
+        <p:cNvGrpSpPr/>
+        <p:nvPr/>
+      </p:nvGrpSpPr>
+      <p:grpSpPr>
+        <a:xfrm>
+          <a:off x="0" y="0"/>
+          <a:ext cx="0" cy="0"/>
+          <a:chOff x="0" y="0"/>
+          <a:chExt cx="0" cy="0"/>
+        </a:xfrm>
+      </p:grpSpPr>
+      <p:sp>
+        <p:nvSpPr>
+          <p:cNvPr id="4" name="Title 3">
+            <a:extLst>
+              <a:ext uri="{FF2B5EF4-FFF2-40B4-BE49-F238E27FC236}">
+                <a16:creationId xmlns:a16="http://schemas.microsoft.com/office/drawing/2014/main" id="{82F2B37B-B5AA-4691-93F9-AA859C84C6CB}"/>
+              </a:ext>
+            </a:extLst>
+          </p:cNvPr>
+          <p:cNvSpPr>
+            <a:spLocks noGrp="1"/>
+          </p:cNvSpPr>
+          <p:nvPr>
+            <p:ph type="title"/>
+          </p:nvPr>
+        </p:nvSpPr>
+        <p:spPr/>
+        <p:txBody>
+          <a:bodyPr/>
+          <a:lstStyle/>
+          <a:p>
+            <a:r>
+              <a:rPr lang="da-DK" dirty="0"/>
+              <a:t>Code documentation</a:t>
+            </a:r>
+            <a:br>
+              <a:rPr lang="da-DK" dirty="0"/>
+            </a:br>
+            <a:r>
+              <a:rPr lang="da-DK" dirty="0"/>
+              <a:t>(other slide deck</a:t>
+            </a:r>
+            <a:endParaRPr lang="en-DK" dirty="0"/>
+          </a:p>
+        </p:txBody>
+      </p:sp>
+    </p:spTree>
+    <p:extLst>
+      <p:ext uri="{BB962C8B-B14F-4D97-AF65-F5344CB8AC3E}">
+        <p14:creationId xmlns:p14="http://schemas.microsoft.com/office/powerpoint/2010/main" val="4001728421"/>
+      </p:ext>
+    </p:extLst>
+  </p:cSld>
+  <p:clrMapOvr>
+    <a:masterClrMapping/>
+  </p:clrMapOvr>
+  <p:transition>
+    <p:fade/>
+  </p:transition>
+</p:sld>
+</file>
+
 <file path=ppt/slides/slide2.xml><?xml version="1.0" encoding="utf-8"?>
 <p:sld xmlns:a="http://schemas.openxmlformats.org/drawingml/2006/main" xmlns:r="http://schemas.openxmlformats.org/officeDocument/2006/relationships" xmlns:p="http://schemas.openxmlformats.org/presentationml/2006/main">
   <p:cSld>
@@ -5087,7 +5318,7 @@
         <p:spPr>
           <a:xfrm>
             <a:off x="274209" y="1212850"/>
-            <a:ext cx="8778240" cy="627864"/>
+            <a:ext cx="8778240" cy="5503045"/>
           </a:xfrm>
         </p:spPr>
         <p:txBody>
@@ -5100,8 +5331,87 @@
                   <a:schemeClr val="bg1"/>
                 </a:solidFill>
               </a:rPr>
-              <a:t>…</a:t>
-            </a:r>
+              <a:t>Other APIs (Microsoft Graph)</a:t>
+            </a:r>
+          </a:p>
+          <a:p>
+            <a:r>
+              <a:rPr lang="en-US" sz="3200" dirty="0">
+                <a:solidFill>
+                  <a:schemeClr val="bg1"/>
+                </a:solidFill>
+              </a:rPr>
+              <a:t>Deployment (Cloud)</a:t>
+            </a:r>
+          </a:p>
+          <a:p>
+            <a:r>
+              <a:rPr lang="en-US" sz="3200" dirty="0">
+                <a:solidFill>
+                  <a:schemeClr val="bg1"/>
+                </a:solidFill>
+              </a:rPr>
+              <a:t>Project optional</a:t>
+            </a:r>
+          </a:p>
+          <a:p>
+            <a:r>
+              <a:rPr lang="en-US" sz="3200" dirty="0">
+                <a:solidFill>
+                  <a:schemeClr val="bg1"/>
+                </a:solidFill>
+              </a:rPr>
+              <a:t>Real world – Waterfall, RAD, SDD etc.</a:t>
+            </a:r>
+          </a:p>
+          <a:p>
+            <a:r>
+              <a:rPr lang="da-DK" sz="3200" dirty="0">
+                <a:solidFill>
+                  <a:schemeClr val="bg1"/>
+                </a:solidFill>
+              </a:rPr>
+              <a:t>Concurrency in Entity Framework Core</a:t>
+            </a:r>
+          </a:p>
+          <a:p>
+            <a:r>
+              <a:rPr lang="da-DK" sz="3200" dirty="0">
+                <a:solidFill>
+                  <a:schemeClr val="bg1"/>
+                </a:solidFill>
+              </a:rPr>
+              <a:t>Development with external database</a:t>
+            </a:r>
+          </a:p>
+          <a:p>
+            <a:r>
+              <a:rPr lang="da-DK" sz="3200" dirty="0">
+                <a:solidFill>
+                  <a:schemeClr val="bg1"/>
+                </a:solidFill>
+              </a:rPr>
+              <a:t>Integration testing</a:t>
+            </a:r>
+          </a:p>
+          <a:p>
+            <a:r>
+              <a:rPr lang="da-DK" sz="3200" dirty="0">
+                <a:solidFill>
+                  <a:schemeClr val="bg1"/>
+                </a:solidFill>
+              </a:rPr>
+              <a:t>Code documentation</a:t>
+            </a:r>
+          </a:p>
+          <a:p>
+            <a:endParaRPr lang="en-US" sz="3200" dirty="0">
+              <a:solidFill>
+                <a:schemeClr val="bg1"/>
+              </a:solidFill>
+            </a:endParaRPr>
+          </a:p>
+          <a:p>
             <a:endParaRPr lang="da-DK" sz="3200" dirty="0">
               <a:solidFill>
                 <a:schemeClr val="bg1"/>
@@ -5114,6 +5424,1194 @@
     <p:extLst>
       <p:ext uri="{BB962C8B-B14F-4D97-AF65-F5344CB8AC3E}">
         <p14:creationId xmlns:p14="http://schemas.microsoft.com/office/powerpoint/2010/main" val="92603182"/>
+      </p:ext>
+    </p:extLst>
+  </p:cSld>
+  <p:clrMapOvr>
+    <a:masterClrMapping/>
+  </p:clrMapOvr>
+  <p:transition>
+    <p:fade/>
+  </p:transition>
+</p:sld>
+</file>
+
+<file path=ppt/slides/slide3.xml><?xml version="1.0" encoding="utf-8"?>
+<p:sld xmlns:a="http://schemas.openxmlformats.org/drawingml/2006/main" xmlns:r="http://schemas.openxmlformats.org/officeDocument/2006/relationships" xmlns:p="http://schemas.openxmlformats.org/presentationml/2006/main">
+  <p:cSld>
+    <p:spTree>
+      <p:nvGrpSpPr>
+        <p:cNvPr id="1" name=""/>
+        <p:cNvGrpSpPr/>
+        <p:nvPr/>
+      </p:nvGrpSpPr>
+      <p:grpSpPr>
+        <a:xfrm>
+          <a:off x="0" y="0"/>
+          <a:ext cx="0" cy="0"/>
+          <a:chOff x="0" y="0"/>
+          <a:chExt cx="0" cy="0"/>
+        </a:xfrm>
+      </p:grpSpPr>
+      <p:sp>
+        <p:nvSpPr>
+          <p:cNvPr id="2" name="Title 1">
+            <a:extLst>
+              <a:ext uri="{FF2B5EF4-FFF2-40B4-BE49-F238E27FC236}">
+                <a16:creationId xmlns:a16="http://schemas.microsoft.com/office/drawing/2014/main" id="{F5C8FF08-FC81-4604-8E5F-AC02FE1B309E}"/>
+              </a:ext>
+            </a:extLst>
+          </p:cNvPr>
+          <p:cNvSpPr>
+            <a:spLocks noGrp="1"/>
+          </p:cNvSpPr>
+          <p:nvPr>
+            <p:ph type="title"/>
+          </p:nvPr>
+        </p:nvSpPr>
+        <p:spPr/>
+        <p:txBody>
+          <a:bodyPr/>
+          <a:lstStyle/>
+          <a:p>
+            <a:r>
+              <a:rPr lang="da-DK" dirty="0"/>
+              <a:t>Other APIs</a:t>
+            </a:r>
+            <a:br>
+              <a:rPr lang="da-DK" dirty="0"/>
+            </a:br>
+            <a:r>
+              <a:rPr lang="da-DK" dirty="0"/>
+              <a:t>Demo</a:t>
+            </a:r>
+            <a:endParaRPr lang="en-DK" dirty="0"/>
+          </a:p>
+        </p:txBody>
+      </p:sp>
+    </p:spTree>
+    <p:extLst>
+      <p:ext uri="{BB962C8B-B14F-4D97-AF65-F5344CB8AC3E}">
+        <p14:creationId xmlns:p14="http://schemas.microsoft.com/office/powerpoint/2010/main" val="818860758"/>
+      </p:ext>
+    </p:extLst>
+  </p:cSld>
+  <p:clrMapOvr>
+    <a:masterClrMapping/>
+  </p:clrMapOvr>
+  <p:transition>
+    <p:fade/>
+  </p:transition>
+</p:sld>
+</file>
+
+<file path=ppt/slides/slide4.xml><?xml version="1.0" encoding="utf-8"?>
+<p:sld xmlns:a="http://schemas.openxmlformats.org/drawingml/2006/main" xmlns:r="http://schemas.openxmlformats.org/officeDocument/2006/relationships" xmlns:p="http://schemas.openxmlformats.org/presentationml/2006/main">
+  <p:cSld>
+    <p:bg>
+      <p:bgPr>
+        <a:solidFill>
+          <a:srgbClr val="505050"/>
+        </a:solidFill>
+        <a:effectLst/>
+      </p:bgPr>
+    </p:bg>
+    <p:spTree>
+      <p:nvGrpSpPr>
+        <p:cNvPr id="1" name=""/>
+        <p:cNvGrpSpPr/>
+        <p:nvPr/>
+      </p:nvGrpSpPr>
+      <p:grpSpPr>
+        <a:xfrm>
+          <a:off x="0" y="0"/>
+          <a:ext cx="0" cy="0"/>
+          <a:chOff x="0" y="0"/>
+          <a:chExt cx="0" cy="0"/>
+        </a:xfrm>
+      </p:grpSpPr>
+      <p:sp>
+        <p:nvSpPr>
+          <p:cNvPr id="2" name="Title 1">
+            <a:extLst>
+              <a:ext uri="{FF2B5EF4-FFF2-40B4-BE49-F238E27FC236}">
+                <a16:creationId xmlns:a16="http://schemas.microsoft.com/office/drawing/2014/main" id="{CF4E4E1F-2BF8-4152-AFA4-BD66B0A69664}"/>
+              </a:ext>
+            </a:extLst>
+          </p:cNvPr>
+          <p:cNvSpPr>
+            <a:spLocks noGrp="1"/>
+          </p:cNvSpPr>
+          <p:nvPr>
+            <p:ph type="title"/>
+          </p:nvPr>
+        </p:nvSpPr>
+        <p:spPr/>
+        <p:txBody>
+          <a:bodyPr/>
+          <a:lstStyle/>
+          <a:p>
+            <a:r>
+              <a:rPr lang="da-DK" dirty="0">
+                <a:solidFill>
+                  <a:schemeClr val="bg1"/>
+                </a:solidFill>
+              </a:rPr>
+              <a:t>Deployment (cloud)</a:t>
+            </a:r>
+            <a:endParaRPr lang="en-DK" dirty="0">
+              <a:solidFill>
+                <a:schemeClr val="bg1"/>
+              </a:solidFill>
+            </a:endParaRPr>
+          </a:p>
+        </p:txBody>
+      </p:sp>
+      <p:sp>
+        <p:nvSpPr>
+          <p:cNvPr id="3" name="Text Placeholder 2">
+            <a:extLst>
+              <a:ext uri="{FF2B5EF4-FFF2-40B4-BE49-F238E27FC236}">
+                <a16:creationId xmlns:a16="http://schemas.microsoft.com/office/drawing/2014/main" id="{9DEA4744-47C9-421F-9716-90B9F7C9931E}"/>
+              </a:ext>
+            </a:extLst>
+          </p:cNvPr>
+          <p:cNvSpPr>
+            <a:spLocks noGrp="1"/>
+          </p:cNvSpPr>
+          <p:nvPr>
+            <p:ph type="body" sz="quarter" idx="10"/>
+          </p:nvPr>
+        </p:nvSpPr>
+        <p:spPr>
+          <a:xfrm>
+            <a:off x="274209" y="1212850"/>
+            <a:ext cx="8778240" cy="4339650"/>
+          </a:xfrm>
+        </p:spPr>
+        <p:txBody>
+          <a:bodyPr/>
+          <a:lstStyle/>
+          <a:p>
+            <a:r>
+              <a:rPr lang="da-DK" dirty="0">
+                <a:solidFill>
+                  <a:schemeClr val="bg1"/>
+                </a:solidFill>
+              </a:rPr>
+              <a:t>Azure</a:t>
+            </a:r>
+          </a:p>
+          <a:p>
+            <a:r>
+              <a:rPr lang="da-DK" dirty="0">
+                <a:solidFill>
+                  <a:schemeClr val="bg1"/>
+                </a:solidFill>
+              </a:rPr>
+              <a:t>AWS</a:t>
+            </a:r>
+          </a:p>
+          <a:p>
+            <a:r>
+              <a:rPr lang="da-DK" dirty="0">
+                <a:solidFill>
+                  <a:schemeClr val="bg1"/>
+                </a:solidFill>
+              </a:rPr>
+              <a:t>Google Cloud</a:t>
+            </a:r>
+          </a:p>
+          <a:p>
+            <a:endParaRPr lang="da-DK" dirty="0">
+              <a:solidFill>
+                <a:schemeClr val="bg1"/>
+              </a:solidFill>
+            </a:endParaRPr>
+          </a:p>
+          <a:p>
+            <a:r>
+              <a:rPr lang="da-DK" i="1" dirty="0">
+                <a:solidFill>
+                  <a:schemeClr val="bg1"/>
+                </a:solidFill>
+              </a:rPr>
+              <a:t>Private cloud</a:t>
+            </a:r>
+          </a:p>
+          <a:p>
+            <a:endParaRPr lang="da-DK" i="1" dirty="0">
+              <a:solidFill>
+                <a:schemeClr val="bg1"/>
+              </a:solidFill>
+            </a:endParaRPr>
+          </a:p>
+          <a:p>
+            <a:r>
+              <a:rPr lang="da-DK" dirty="0">
+                <a:solidFill>
+                  <a:schemeClr val="bg1"/>
+                </a:solidFill>
+              </a:rPr>
+              <a:t>Cheap stuff</a:t>
+            </a:r>
+            <a:endParaRPr lang="en-DK" dirty="0">
+              <a:solidFill>
+                <a:schemeClr val="bg1"/>
+              </a:solidFill>
+            </a:endParaRPr>
+          </a:p>
+        </p:txBody>
+      </p:sp>
+    </p:spTree>
+    <p:extLst>
+      <p:ext uri="{BB962C8B-B14F-4D97-AF65-F5344CB8AC3E}">
+        <p14:creationId xmlns:p14="http://schemas.microsoft.com/office/powerpoint/2010/main" val="3635546035"/>
+      </p:ext>
+    </p:extLst>
+  </p:cSld>
+  <p:clrMapOvr>
+    <a:masterClrMapping/>
+  </p:clrMapOvr>
+  <p:transition>
+    <p:fade/>
+  </p:transition>
+</p:sld>
+</file>
+
+<file path=ppt/slides/slide5.xml><?xml version="1.0" encoding="utf-8"?>
+<p:sld xmlns:a="http://schemas.openxmlformats.org/drawingml/2006/main" xmlns:r="http://schemas.openxmlformats.org/officeDocument/2006/relationships" xmlns:p="http://schemas.openxmlformats.org/presentationml/2006/main">
+  <p:cSld>
+    <p:bg>
+      <p:bgPr>
+        <a:solidFill>
+          <a:srgbClr val="00188F"/>
+        </a:solidFill>
+        <a:effectLst/>
+      </p:bgPr>
+    </p:bg>
+    <p:spTree>
+      <p:nvGrpSpPr>
+        <p:cNvPr id="1" name=""/>
+        <p:cNvGrpSpPr/>
+        <p:nvPr/>
+      </p:nvGrpSpPr>
+      <p:grpSpPr>
+        <a:xfrm>
+          <a:off x="0" y="0"/>
+          <a:ext cx="0" cy="0"/>
+          <a:chOff x="0" y="0"/>
+          <a:chExt cx="0" cy="0"/>
+        </a:xfrm>
+      </p:grpSpPr>
+      <p:sp>
+        <p:nvSpPr>
+          <p:cNvPr id="2" name="Title 1">
+            <a:extLst>
+              <a:ext uri="{FF2B5EF4-FFF2-40B4-BE49-F238E27FC236}">
+                <a16:creationId xmlns:a16="http://schemas.microsoft.com/office/drawing/2014/main" id="{F5C8FF08-FC81-4604-8E5F-AC02FE1B309E}"/>
+              </a:ext>
+            </a:extLst>
+          </p:cNvPr>
+          <p:cNvSpPr>
+            <a:spLocks noGrp="1"/>
+          </p:cNvSpPr>
+          <p:nvPr>
+            <p:ph type="title"/>
+          </p:nvPr>
+        </p:nvSpPr>
+        <p:spPr/>
+        <p:txBody>
+          <a:bodyPr/>
+          <a:lstStyle/>
+          <a:p>
+            <a:r>
+              <a:rPr lang="da-DK" dirty="0"/>
+              <a:t>Cloud deployment</a:t>
+            </a:r>
+            <a:br>
+              <a:rPr lang="da-DK" dirty="0"/>
+            </a:br>
+            <a:r>
+              <a:rPr lang="da-DK" dirty="0"/>
+              <a:t>Demo</a:t>
+            </a:r>
+            <a:endParaRPr lang="en-DK" dirty="0"/>
+          </a:p>
+        </p:txBody>
+      </p:sp>
+    </p:spTree>
+    <p:extLst>
+      <p:ext uri="{BB962C8B-B14F-4D97-AF65-F5344CB8AC3E}">
+        <p14:creationId xmlns:p14="http://schemas.microsoft.com/office/powerpoint/2010/main" val="3676529598"/>
+      </p:ext>
+    </p:extLst>
+  </p:cSld>
+  <p:clrMapOvr>
+    <a:masterClrMapping/>
+  </p:clrMapOvr>
+  <p:transition>
+    <p:fade/>
+  </p:transition>
+</p:sld>
+</file>
+
+<file path=ppt/slides/slide6.xml><?xml version="1.0" encoding="utf-8"?>
+<p:sld xmlns:a="http://schemas.openxmlformats.org/drawingml/2006/main" xmlns:r="http://schemas.openxmlformats.org/officeDocument/2006/relationships" xmlns:p="http://schemas.openxmlformats.org/presentationml/2006/main">
+  <p:cSld>
+    <p:bg>
+      <p:bgPr>
+        <a:solidFill>
+          <a:srgbClr val="0070C0"/>
+        </a:solidFill>
+        <a:effectLst/>
+      </p:bgPr>
+    </p:bg>
+    <p:spTree>
+      <p:nvGrpSpPr>
+        <p:cNvPr id="1" name=""/>
+        <p:cNvGrpSpPr/>
+        <p:nvPr/>
+      </p:nvGrpSpPr>
+      <p:grpSpPr>
+        <a:xfrm>
+          <a:off x="0" y="0"/>
+          <a:ext cx="0" cy="0"/>
+          <a:chOff x="0" y="0"/>
+          <a:chExt cx="0" cy="0"/>
+        </a:xfrm>
+      </p:grpSpPr>
+      <p:sp>
+        <p:nvSpPr>
+          <p:cNvPr id="2" name="Title 1">
+            <a:extLst>
+              <a:ext uri="{FF2B5EF4-FFF2-40B4-BE49-F238E27FC236}">
+                <a16:creationId xmlns:a16="http://schemas.microsoft.com/office/drawing/2014/main" id="{09D99307-B5DC-44CE-A93F-615838CAD90D}"/>
+              </a:ext>
+            </a:extLst>
+          </p:cNvPr>
+          <p:cNvSpPr>
+            <a:spLocks noGrp="1"/>
+          </p:cNvSpPr>
+          <p:nvPr>
+            <p:ph type="title"/>
+          </p:nvPr>
+        </p:nvSpPr>
+        <p:spPr/>
+        <p:txBody>
+          <a:bodyPr/>
+          <a:lstStyle/>
+          <a:p>
+            <a:r>
+              <a:rPr lang="da-DK" dirty="0">
+                <a:solidFill>
+                  <a:schemeClr val="bg1"/>
+                </a:solidFill>
+              </a:rPr>
+              <a:t>Project optional</a:t>
+            </a:r>
+            <a:endParaRPr lang="en-DK" dirty="0">
+              <a:solidFill>
+                <a:schemeClr val="bg1"/>
+              </a:solidFill>
+            </a:endParaRPr>
+          </a:p>
+        </p:txBody>
+      </p:sp>
+      <p:sp>
+        <p:nvSpPr>
+          <p:cNvPr id="3" name="Text Placeholder 2">
+            <a:extLst>
+              <a:ext uri="{FF2B5EF4-FFF2-40B4-BE49-F238E27FC236}">
+                <a16:creationId xmlns:a16="http://schemas.microsoft.com/office/drawing/2014/main" id="{3CDF8A9F-574A-44B7-9615-C431933F756B}"/>
+              </a:ext>
+            </a:extLst>
+          </p:cNvPr>
+          <p:cNvSpPr>
+            <a:spLocks noGrp="1"/>
+          </p:cNvSpPr>
+          <p:nvPr>
+            <p:ph type="body" sz="quarter" idx="10"/>
+          </p:nvPr>
+        </p:nvSpPr>
+        <p:spPr>
+          <a:xfrm>
+            <a:off x="274209" y="1212850"/>
+            <a:ext cx="8778240" cy="1292662"/>
+          </a:xfrm>
+        </p:spPr>
+        <p:txBody>
+          <a:bodyPr/>
+          <a:lstStyle/>
+          <a:p>
+            <a:r>
+              <a:rPr lang="da-DK" dirty="0">
+                <a:solidFill>
+                  <a:schemeClr val="bg1"/>
+                </a:solidFill>
+              </a:rPr>
+              <a:t>Cloud deployment</a:t>
+            </a:r>
+          </a:p>
+          <a:p>
+            <a:r>
+              <a:rPr lang="da-DK" dirty="0">
+                <a:solidFill>
+                  <a:schemeClr val="bg1"/>
+                </a:solidFill>
+              </a:rPr>
+              <a:t>App Store deployment</a:t>
+            </a:r>
+            <a:endParaRPr lang="en-DK" dirty="0">
+              <a:solidFill>
+                <a:schemeClr val="bg1"/>
+              </a:solidFill>
+            </a:endParaRPr>
+          </a:p>
+        </p:txBody>
+      </p:sp>
+    </p:spTree>
+    <p:extLst>
+      <p:ext uri="{BB962C8B-B14F-4D97-AF65-F5344CB8AC3E}">
+        <p14:creationId xmlns:p14="http://schemas.microsoft.com/office/powerpoint/2010/main" val="3275108618"/>
+      </p:ext>
+    </p:extLst>
+  </p:cSld>
+  <p:clrMapOvr>
+    <a:masterClrMapping/>
+  </p:clrMapOvr>
+  <p:transition>
+    <p:fade/>
+  </p:transition>
+</p:sld>
+</file>
+
+<file path=ppt/slides/slide7.xml><?xml version="1.0" encoding="utf-8"?>
+<p:sld xmlns:a="http://schemas.openxmlformats.org/drawingml/2006/main" xmlns:r="http://schemas.openxmlformats.org/officeDocument/2006/relationships" xmlns:p="http://schemas.openxmlformats.org/presentationml/2006/main">
+  <p:cSld>
+    <p:bg>
+      <p:bgPr>
+        <a:solidFill>
+          <a:srgbClr val="7030A0"/>
+        </a:solidFill>
+        <a:effectLst/>
+      </p:bgPr>
+    </p:bg>
+    <p:spTree>
+      <p:nvGrpSpPr>
+        <p:cNvPr id="1" name=""/>
+        <p:cNvGrpSpPr/>
+        <p:nvPr/>
+      </p:nvGrpSpPr>
+      <p:grpSpPr>
+        <a:xfrm>
+          <a:off x="0" y="0"/>
+          <a:ext cx="0" cy="0"/>
+          <a:chOff x="0" y="0"/>
+          <a:chExt cx="0" cy="0"/>
+        </a:xfrm>
+      </p:grpSpPr>
+      <p:sp>
+        <p:nvSpPr>
+          <p:cNvPr id="2" name="Title 1">
+            <a:extLst>
+              <a:ext uri="{FF2B5EF4-FFF2-40B4-BE49-F238E27FC236}">
+                <a16:creationId xmlns:a16="http://schemas.microsoft.com/office/drawing/2014/main" id="{577D6A3D-26B2-4E99-9F93-AF6EBBC4128F}"/>
+              </a:ext>
+            </a:extLst>
+          </p:cNvPr>
+          <p:cNvSpPr>
+            <a:spLocks noGrp="1"/>
+          </p:cNvSpPr>
+          <p:nvPr>
+            <p:ph type="title"/>
+          </p:nvPr>
+        </p:nvSpPr>
+        <p:spPr/>
+        <p:txBody>
+          <a:bodyPr/>
+          <a:lstStyle/>
+          <a:p>
+            <a:r>
+              <a:rPr lang="da-DK" dirty="0">
+                <a:solidFill>
+                  <a:schemeClr val="bg1"/>
+                </a:solidFill>
+              </a:rPr>
+              <a:t>Real world – developer’s tool chest</a:t>
+            </a:r>
+            <a:endParaRPr lang="en-DK" dirty="0">
+              <a:solidFill>
+                <a:schemeClr val="bg1"/>
+              </a:solidFill>
+            </a:endParaRPr>
+          </a:p>
+        </p:txBody>
+      </p:sp>
+      <p:sp>
+        <p:nvSpPr>
+          <p:cNvPr id="3" name="Text Placeholder 2">
+            <a:extLst>
+              <a:ext uri="{FF2B5EF4-FFF2-40B4-BE49-F238E27FC236}">
+                <a16:creationId xmlns:a16="http://schemas.microsoft.com/office/drawing/2014/main" id="{9B3765C7-2F01-417D-A35A-36BF20A3C603}"/>
+              </a:ext>
+            </a:extLst>
+          </p:cNvPr>
+          <p:cNvSpPr>
+            <a:spLocks noGrp="1"/>
+          </p:cNvSpPr>
+          <p:nvPr>
+            <p:ph type="body" sz="quarter" idx="10"/>
+          </p:nvPr>
+        </p:nvSpPr>
+        <p:spPr>
+          <a:xfrm>
+            <a:off x="274209" y="1212850"/>
+            <a:ext cx="8778240" cy="5558445"/>
+          </a:xfrm>
+        </p:spPr>
+        <p:txBody>
+          <a:bodyPr/>
+          <a:lstStyle/>
+          <a:p>
+            <a:r>
+              <a:rPr lang="da-DK" dirty="0">
+                <a:solidFill>
+                  <a:schemeClr val="bg1"/>
+                </a:solidFill>
+              </a:rPr>
+              <a:t>Waterfall</a:t>
+            </a:r>
+          </a:p>
+          <a:p>
+            <a:r>
+              <a:rPr lang="da-DK" dirty="0">
+                <a:solidFill>
+                  <a:schemeClr val="bg1"/>
+                </a:solidFill>
+              </a:rPr>
+              <a:t>RAD</a:t>
+            </a:r>
+          </a:p>
+          <a:p>
+            <a:r>
+              <a:rPr lang="da-DK" dirty="0">
+                <a:solidFill>
+                  <a:schemeClr val="bg1"/>
+                </a:solidFill>
+              </a:rPr>
+              <a:t>SDD</a:t>
+            </a:r>
+          </a:p>
+          <a:p>
+            <a:r>
+              <a:rPr lang="da-DK" dirty="0">
+                <a:solidFill>
+                  <a:schemeClr val="bg1"/>
+                </a:solidFill>
+              </a:rPr>
+              <a:t>UML</a:t>
+            </a:r>
+          </a:p>
+          <a:p>
+            <a:r>
+              <a:rPr lang="da-DK" dirty="0">
+                <a:solidFill>
+                  <a:schemeClr val="bg1"/>
+                </a:solidFill>
+              </a:rPr>
+              <a:t>Agile</a:t>
+            </a:r>
+          </a:p>
+          <a:p>
+            <a:r>
+              <a:rPr lang="da-DK" dirty="0">
+                <a:solidFill>
+                  <a:schemeClr val="bg1"/>
+                </a:solidFill>
+              </a:rPr>
+              <a:t>MVP</a:t>
+            </a:r>
+          </a:p>
+          <a:p>
+            <a:r>
+              <a:rPr lang="da-DK" dirty="0">
+                <a:solidFill>
+                  <a:schemeClr val="bg1"/>
+                </a:solidFill>
+              </a:rPr>
+              <a:t>Vertical slice</a:t>
+            </a:r>
+          </a:p>
+          <a:p>
+            <a:r>
+              <a:rPr lang="da-DK" dirty="0">
+                <a:solidFill>
+                  <a:schemeClr val="bg1"/>
+                </a:solidFill>
+              </a:rPr>
+              <a:t>SCRUM</a:t>
+            </a:r>
+          </a:p>
+          <a:p>
+            <a:r>
+              <a:rPr lang="da-DK" dirty="0">
+                <a:solidFill>
+                  <a:schemeClr val="bg1"/>
+                </a:solidFill>
+              </a:rPr>
+              <a:t>SAFE – Scaled Agile Framework</a:t>
+            </a:r>
+          </a:p>
+        </p:txBody>
+      </p:sp>
+      <p:sp>
+        <p:nvSpPr>
+          <p:cNvPr id="4" name="Rectangle 3">
+            <a:extLst>
+              <a:ext uri="{FF2B5EF4-FFF2-40B4-BE49-F238E27FC236}">
+                <a16:creationId xmlns:a16="http://schemas.microsoft.com/office/drawing/2014/main" id="{77CA3D88-12C8-44BD-9880-5850170BBBE4}"/>
+              </a:ext>
+            </a:extLst>
+          </p:cNvPr>
+          <p:cNvSpPr/>
+          <p:nvPr/>
+        </p:nvSpPr>
+        <p:spPr>
+          <a:xfrm rot="2257211">
+            <a:off x="2165535" y="2674898"/>
+            <a:ext cx="4849230" cy="830997"/>
+          </a:xfrm>
+          <a:prstGeom prst="rect">
+            <a:avLst/>
+          </a:prstGeom>
+          <a:solidFill>
+            <a:srgbClr val="C00000"/>
+          </a:solidFill>
+        </p:spPr>
+        <p:txBody>
+          <a:bodyPr wrap="square">
+            <a:spAutoFit/>
+          </a:bodyPr>
+          <a:lstStyle/>
+          <a:p>
+            <a:r>
+              <a:rPr lang="da-DK" sz="4800" dirty="0">
+                <a:solidFill>
+                  <a:schemeClr val="bg1"/>
+                </a:solidFill>
+                <a:latin typeface="+mj-lt"/>
+              </a:rPr>
+              <a:t>Water-SCRUM-fall</a:t>
+            </a:r>
+            <a:endParaRPr lang="en-DK" sz="4800" dirty="0">
+              <a:solidFill>
+                <a:schemeClr val="bg1"/>
+              </a:solidFill>
+              <a:latin typeface="+mj-lt"/>
+            </a:endParaRPr>
+          </a:p>
+        </p:txBody>
+      </p:sp>
+    </p:spTree>
+    <p:extLst>
+      <p:ext uri="{BB962C8B-B14F-4D97-AF65-F5344CB8AC3E}">
+        <p14:creationId xmlns:p14="http://schemas.microsoft.com/office/powerpoint/2010/main" val="344985021"/>
+      </p:ext>
+    </p:extLst>
+  </p:cSld>
+  <p:clrMapOvr>
+    <a:masterClrMapping/>
+  </p:clrMapOvr>
+  <p:transition>
+    <p:fade/>
+  </p:transition>
+  <p:timing>
+    <p:tnLst>
+      <p:par>
+        <p:cTn id="1" dur="indefinite" restart="never" nodeType="tmRoot">
+          <p:childTnLst>
+            <p:seq concurrent="1" nextAc="seek">
+              <p:cTn id="2" dur="indefinite" nodeType="mainSeq">
+                <p:childTnLst>
+                  <p:par>
+                    <p:cTn id="3" fill="hold">
+                      <p:stCondLst>
+                        <p:cond delay="indefinite"/>
+                      </p:stCondLst>
+                      <p:childTnLst>
+                        <p:par>
+                          <p:cTn id="4" fill="hold">
+                            <p:stCondLst>
+                              <p:cond delay="0"/>
+                            </p:stCondLst>
+                            <p:childTnLst>
+                              <p:par>
+                                <p:cTn id="5" presetID="1" presetClass="entr" presetSubtype="0" fill="hold" grpId="0" nodeType="clickEffect">
+                                  <p:stCondLst>
+                                    <p:cond delay="0"/>
+                                  </p:stCondLst>
+                                  <p:childTnLst>
+                                    <p:set>
+                                      <p:cBhvr>
+                                        <p:cTn id="6" dur="1" fill="hold">
+                                          <p:stCondLst>
+                                            <p:cond delay="0"/>
+                                          </p:stCondLst>
+                                        </p:cTn>
+                                        <p:tgtEl>
+                                          <p:spTgt spid="4"/>
+                                        </p:tgtEl>
+                                        <p:attrNameLst>
+                                          <p:attrName>style.visibility</p:attrName>
+                                        </p:attrNameLst>
+                                      </p:cBhvr>
+                                      <p:to>
+                                        <p:strVal val="visible"/>
+                                      </p:to>
+                                    </p:set>
+                                  </p:childTnLst>
+                                </p:cTn>
+                              </p:par>
+                            </p:childTnLst>
+                          </p:cTn>
+                        </p:par>
+                      </p:childTnLst>
+                    </p:cTn>
+                  </p:par>
+                </p:childTnLst>
+              </p:cTn>
+              <p:prevCondLst>
+                <p:cond evt="onPrev" delay="0">
+                  <p:tgtEl>
+                    <p:sldTgt/>
+                  </p:tgtEl>
+                </p:cond>
+              </p:prevCondLst>
+              <p:nextCondLst>
+                <p:cond evt="onNext" delay="0">
+                  <p:tgtEl>
+                    <p:sldTgt/>
+                  </p:tgtEl>
+                </p:cond>
+              </p:nextCondLst>
+            </p:seq>
+          </p:childTnLst>
+        </p:cTn>
+      </p:par>
+    </p:tnLst>
+    <p:bldLst>
+      <p:bldP spid="4" grpId="0" animBg="1"/>
+    </p:bldLst>
+  </p:timing>
+</p:sld>
+</file>
+
+<file path=ppt/slides/slide8.xml><?xml version="1.0" encoding="utf-8"?>
+<p:sld xmlns:a="http://schemas.openxmlformats.org/drawingml/2006/main" xmlns:r="http://schemas.openxmlformats.org/officeDocument/2006/relationships" xmlns:p="http://schemas.openxmlformats.org/presentationml/2006/main">
+  <p:cSld>
+    <p:bg>
+      <p:bgPr>
+        <a:solidFill>
+          <a:schemeClr val="tx1"/>
+        </a:solidFill>
+        <a:effectLst/>
+      </p:bgPr>
+    </p:bg>
+    <p:spTree>
+      <p:nvGrpSpPr>
+        <p:cNvPr id="1" name=""/>
+        <p:cNvGrpSpPr/>
+        <p:nvPr/>
+      </p:nvGrpSpPr>
+      <p:grpSpPr>
+        <a:xfrm>
+          <a:off x="0" y="0"/>
+          <a:ext cx="0" cy="0"/>
+          <a:chOff x="0" y="0"/>
+          <a:chExt cx="0" cy="0"/>
+        </a:xfrm>
+      </p:grpSpPr>
+      <p:sp>
+        <p:nvSpPr>
+          <p:cNvPr id="5" name="Title 4">
+            <a:extLst>
+              <a:ext uri="{FF2B5EF4-FFF2-40B4-BE49-F238E27FC236}">
+                <a16:creationId xmlns:a16="http://schemas.microsoft.com/office/drawing/2014/main" id="{E0886A44-E1DA-4E21-95FE-638A20925591}"/>
+              </a:ext>
+            </a:extLst>
+          </p:cNvPr>
+          <p:cNvSpPr>
+            <a:spLocks noGrp="1"/>
+          </p:cNvSpPr>
+          <p:nvPr>
+            <p:ph type="title"/>
+          </p:nvPr>
+        </p:nvSpPr>
+        <p:spPr/>
+        <p:txBody>
+          <a:bodyPr/>
+          <a:lstStyle/>
+          <a:p>
+            <a:r>
+              <a:rPr lang="da-DK" dirty="0">
+                <a:solidFill>
+                  <a:schemeClr val="bg1"/>
+                </a:solidFill>
+              </a:rPr>
+              <a:t>Concurrency in EF Core</a:t>
+            </a:r>
+            <a:endParaRPr lang="en-DK" dirty="0">
+              <a:solidFill>
+                <a:schemeClr val="bg1"/>
+              </a:solidFill>
+            </a:endParaRPr>
+          </a:p>
+        </p:txBody>
+      </p:sp>
+      <p:sp>
+        <p:nvSpPr>
+          <p:cNvPr id="6" name="Text Placeholder 5">
+            <a:extLst>
+              <a:ext uri="{FF2B5EF4-FFF2-40B4-BE49-F238E27FC236}">
+                <a16:creationId xmlns:a16="http://schemas.microsoft.com/office/drawing/2014/main" id="{309545C3-5C08-4E1B-A153-CDF35194E414}"/>
+              </a:ext>
+            </a:extLst>
+          </p:cNvPr>
+          <p:cNvSpPr>
+            <a:spLocks noGrp="1"/>
+          </p:cNvSpPr>
+          <p:nvPr>
+            <p:ph type="body" sz="quarter" idx="10"/>
+          </p:nvPr>
+        </p:nvSpPr>
+        <p:spPr>
+          <a:xfrm>
+            <a:off x="274209" y="1212850"/>
+            <a:ext cx="8778240" cy="5336846"/>
+          </a:xfrm>
+        </p:spPr>
+        <p:txBody>
+          <a:bodyPr/>
+          <a:lstStyle/>
+          <a:p>
+            <a:r>
+              <a:rPr lang="da-DK" dirty="0">
+                <a:hlinkClick r:id="rId2"/>
+              </a:rPr>
+              <a:t>https://docs.microsoft.com/en-us/ef/core/saving/concurrency</a:t>
+            </a:r>
+            <a:endParaRPr lang="da-DK" dirty="0"/>
+          </a:p>
+          <a:p>
+            <a:endParaRPr lang="da-DK" dirty="0"/>
+          </a:p>
+          <a:p>
+            <a:r>
+              <a:rPr lang="da-DK" dirty="0">
+                <a:solidFill>
+                  <a:schemeClr val="bg1"/>
+                </a:solidFill>
+              </a:rPr>
+              <a:t>Only one </a:t>
+            </a:r>
+            <a:r>
+              <a:rPr lang="da-DK" i="1" dirty="0">
+                <a:solidFill>
+                  <a:schemeClr val="bg1"/>
+                </a:solidFill>
+              </a:rPr>
+              <a:t>SaveChangesAsync </a:t>
+            </a:r>
+            <a:r>
+              <a:rPr lang="da-DK" dirty="0">
+                <a:solidFill>
+                  <a:schemeClr val="bg1"/>
+                </a:solidFill>
+              </a:rPr>
+              <a:t>per controller action</a:t>
+            </a:r>
+            <a:r>
+              <a:rPr lang="da-DK" dirty="0"/>
+              <a:t> </a:t>
+            </a:r>
+          </a:p>
+          <a:p>
+            <a:pPr marL="571500" indent="-571500">
+              <a:buFont typeface="Wingdings" panose="05000000000000000000" pitchFamily="2" charset="2"/>
+              <a:buChar char="à"/>
+            </a:pPr>
+            <a:r>
+              <a:rPr lang="da-DK" dirty="0">
+                <a:solidFill>
+                  <a:schemeClr val="bg1"/>
+                </a:solidFill>
+                <a:sym typeface="Wingdings" panose="05000000000000000000" pitchFamily="2" charset="2"/>
+              </a:rPr>
+              <a:t>Only one </a:t>
+            </a:r>
+            <a:r>
+              <a:rPr lang="da-DK" i="1" dirty="0">
+                <a:solidFill>
+                  <a:schemeClr val="bg1"/>
+                </a:solidFill>
+                <a:sym typeface="Wingdings" panose="05000000000000000000" pitchFamily="2" charset="2"/>
+              </a:rPr>
+              <a:t>write</a:t>
+            </a:r>
+            <a:r>
+              <a:rPr lang="da-DK" dirty="0">
+                <a:solidFill>
+                  <a:schemeClr val="bg1"/>
+                </a:solidFill>
+                <a:sym typeface="Wingdings" panose="05000000000000000000" pitchFamily="2" charset="2"/>
+              </a:rPr>
+              <a:t> repository reference</a:t>
+            </a:r>
+          </a:p>
+          <a:p>
+            <a:pPr marL="571500" indent="-571500">
+              <a:buFont typeface="Wingdings" panose="05000000000000000000" pitchFamily="2" charset="2"/>
+              <a:buChar char="à"/>
+            </a:pPr>
+            <a:r>
+              <a:rPr lang="da-DK" dirty="0">
+                <a:solidFill>
+                  <a:schemeClr val="bg1"/>
+                </a:solidFill>
+                <a:sym typeface="Wingdings" panose="05000000000000000000" pitchFamily="2" charset="2"/>
+              </a:rPr>
+              <a:t>Only one </a:t>
+            </a:r>
+            <a:r>
+              <a:rPr lang="da-DK" i="1" dirty="0">
+                <a:solidFill>
+                  <a:schemeClr val="bg1"/>
+                </a:solidFill>
+                <a:sym typeface="Wingdings" panose="05000000000000000000" pitchFamily="2" charset="2"/>
+              </a:rPr>
+              <a:t>write </a:t>
+            </a:r>
+            <a:r>
+              <a:rPr lang="da-DK" dirty="0">
+                <a:solidFill>
+                  <a:schemeClr val="bg1"/>
+                </a:solidFill>
+                <a:sym typeface="Wingdings" panose="05000000000000000000" pitchFamily="2" charset="2"/>
+              </a:rPr>
+              <a:t>call to said repository</a:t>
+            </a:r>
+          </a:p>
+          <a:p>
+            <a:pPr marL="571500" indent="-571500">
+              <a:buFont typeface="Wingdings" panose="05000000000000000000" pitchFamily="2" charset="2"/>
+              <a:buChar char="à"/>
+            </a:pPr>
+            <a:endParaRPr lang="da-DK" dirty="0">
+              <a:solidFill>
+                <a:schemeClr val="bg1"/>
+              </a:solidFill>
+              <a:sym typeface="Wingdings" panose="05000000000000000000" pitchFamily="2" charset="2"/>
+            </a:endParaRPr>
+          </a:p>
+          <a:p>
+            <a:r>
+              <a:rPr lang="da-DK" dirty="0">
+                <a:solidFill>
+                  <a:schemeClr val="bg1"/>
+                </a:solidFill>
+                <a:sym typeface="Wingdings" panose="05000000000000000000" pitchFamily="2" charset="2"/>
+              </a:rPr>
+              <a:t>DEMO</a:t>
+            </a:r>
+            <a:endParaRPr lang="en-DK" dirty="0">
+              <a:solidFill>
+                <a:schemeClr val="bg1"/>
+              </a:solidFill>
+            </a:endParaRPr>
+          </a:p>
+        </p:txBody>
+      </p:sp>
+    </p:spTree>
+    <p:extLst>
+      <p:ext uri="{BB962C8B-B14F-4D97-AF65-F5344CB8AC3E}">
+        <p14:creationId xmlns:p14="http://schemas.microsoft.com/office/powerpoint/2010/main" val="1435787488"/>
+      </p:ext>
+    </p:extLst>
+  </p:cSld>
+  <p:clrMapOvr>
+    <a:masterClrMapping/>
+  </p:clrMapOvr>
+  <p:transition>
+    <p:fade/>
+  </p:transition>
+</p:sld>
+</file>
+
+<file path=ppt/slides/slide9.xml><?xml version="1.0" encoding="utf-8"?>
+<p:sld xmlns:a="http://schemas.openxmlformats.org/drawingml/2006/main" xmlns:r="http://schemas.openxmlformats.org/officeDocument/2006/relationships" xmlns:p="http://schemas.openxmlformats.org/presentationml/2006/main">
+  <p:cSld>
+    <p:bg>
+      <p:bgPr>
+        <a:solidFill>
+          <a:srgbClr val="FFC000"/>
+        </a:solidFill>
+        <a:effectLst/>
+      </p:bgPr>
+    </p:bg>
+    <p:spTree>
+      <p:nvGrpSpPr>
+        <p:cNvPr id="1" name=""/>
+        <p:cNvGrpSpPr/>
+        <p:nvPr/>
+      </p:nvGrpSpPr>
+      <p:grpSpPr>
+        <a:xfrm>
+          <a:off x="0" y="0"/>
+          <a:ext cx="0" cy="0"/>
+          <a:chOff x="0" y="0"/>
+          <a:chExt cx="0" cy="0"/>
+        </a:xfrm>
+      </p:grpSpPr>
+      <p:sp>
+        <p:nvSpPr>
+          <p:cNvPr id="6" name="Title 5">
+            <a:extLst>
+              <a:ext uri="{FF2B5EF4-FFF2-40B4-BE49-F238E27FC236}">
+                <a16:creationId xmlns:a16="http://schemas.microsoft.com/office/drawing/2014/main" id="{36278E47-0D56-45BD-BC2C-86821F7897E6}"/>
+              </a:ext>
+            </a:extLst>
+          </p:cNvPr>
+          <p:cNvSpPr>
+            <a:spLocks noGrp="1"/>
+          </p:cNvSpPr>
+          <p:nvPr>
+            <p:ph type="title"/>
+          </p:nvPr>
+        </p:nvSpPr>
+        <p:spPr/>
+        <p:txBody>
+          <a:bodyPr/>
+          <a:lstStyle/>
+          <a:p>
+            <a:r>
+              <a:rPr lang="da-DK" dirty="0">
+                <a:solidFill>
+                  <a:schemeClr val="accent6"/>
+                </a:solidFill>
+              </a:rPr>
+              <a:t>Development with external (real?) database</a:t>
+            </a:r>
+            <a:endParaRPr lang="en-DK" dirty="0">
+              <a:solidFill>
+                <a:schemeClr val="accent6"/>
+              </a:solidFill>
+            </a:endParaRPr>
+          </a:p>
+        </p:txBody>
+      </p:sp>
+      <p:sp>
+        <p:nvSpPr>
+          <p:cNvPr id="7" name="Text Placeholder 6">
+            <a:extLst>
+              <a:ext uri="{FF2B5EF4-FFF2-40B4-BE49-F238E27FC236}">
+                <a16:creationId xmlns:a16="http://schemas.microsoft.com/office/drawing/2014/main" id="{7043F616-2B70-4EE6-BACC-20D5CE76B1B0}"/>
+              </a:ext>
+            </a:extLst>
+          </p:cNvPr>
+          <p:cNvSpPr>
+            <a:spLocks noGrp="1"/>
+          </p:cNvSpPr>
+          <p:nvPr>
+            <p:ph type="body" sz="quarter" idx="10"/>
+          </p:nvPr>
+        </p:nvSpPr>
+        <p:spPr>
+          <a:xfrm>
+            <a:off x="273050" y="1759921"/>
+            <a:ext cx="8778240" cy="2511457"/>
+          </a:xfrm>
+        </p:spPr>
+        <p:txBody>
+          <a:bodyPr/>
+          <a:lstStyle/>
+          <a:p>
+            <a:r>
+              <a:rPr lang="da-DK" dirty="0">
+                <a:solidFill>
+                  <a:schemeClr val="accent6"/>
+                </a:solidFill>
+              </a:rPr>
+              <a:t>Don’t</a:t>
+            </a:r>
+          </a:p>
+          <a:p>
+            <a:r>
+              <a:rPr lang="da-DK" dirty="0">
+                <a:solidFill>
+                  <a:schemeClr val="accent6"/>
+                </a:solidFill>
+              </a:rPr>
+              <a:t>Dev &gt; 1 </a:t>
+            </a:r>
+            <a:r>
+              <a:rPr lang="da-DK" dirty="0">
+                <a:solidFill>
+                  <a:schemeClr val="accent6"/>
+                </a:solidFill>
+                <a:sym typeface="Wingdings" panose="05000000000000000000" pitchFamily="2" charset="2"/>
+              </a:rPr>
+              <a:t> migrations?</a:t>
+            </a:r>
+            <a:endParaRPr lang="da-DK" dirty="0">
+              <a:solidFill>
+                <a:schemeClr val="accent6"/>
+              </a:solidFill>
+            </a:endParaRPr>
+          </a:p>
+          <a:p>
+            <a:r>
+              <a:rPr lang="da-DK" dirty="0">
+                <a:solidFill>
+                  <a:schemeClr val="accent6"/>
+                </a:solidFill>
+              </a:rPr>
+              <a:t>But? </a:t>
+            </a:r>
+            <a:r>
+              <a:rPr lang="da-DK" dirty="0">
+                <a:solidFill>
+                  <a:schemeClr val="accent6"/>
+                </a:solidFill>
+                <a:sym typeface="Wingdings" panose="05000000000000000000" pitchFamily="2" charset="2"/>
+              </a:rPr>
+              <a:t> </a:t>
+            </a:r>
+            <a:r>
+              <a:rPr lang="da-DK" dirty="0">
+                <a:solidFill>
+                  <a:schemeClr val="accent6"/>
+                </a:solidFill>
+              </a:rPr>
+              <a:t>Non-production snapshot or sample</a:t>
+            </a:r>
+          </a:p>
+          <a:p>
+            <a:r>
+              <a:rPr lang="da-DK" dirty="0">
+                <a:solidFill>
+                  <a:schemeClr val="accent6"/>
+                </a:solidFill>
+              </a:rPr>
+              <a:t>SQL LocalDB and Sqlite FTW</a:t>
+            </a:r>
+          </a:p>
+        </p:txBody>
+      </p:sp>
+    </p:spTree>
+    <p:extLst>
+      <p:ext uri="{BB962C8B-B14F-4D97-AF65-F5344CB8AC3E}">
+        <p14:creationId xmlns:p14="http://schemas.microsoft.com/office/powerpoint/2010/main" val="1874726320"/>
       </p:ext>
     </p:extLst>
   </p:cSld>

</xml_diff>